<commit_message>
update eclipse-mm and comparison excel
</commit_message>
<xml_diff>
--- a/Figures_Hochformat.pptx
+++ b/Figures_Hochformat.pptx
@@ -251,7 +251,7 @@
           <a:p>
             <a:fld id="{221DF790-08EF-4309-8C7D-573F11C98FD5}" type="datetimeFigureOut">
               <a:rPr lang="de-AT" smtClean="0"/>
-              <a:t>15.02.2022</a:t>
+              <a:t>18.02.2022</a:t>
             </a:fld>
             <a:endParaRPr lang="de-AT"/>
           </a:p>
@@ -421,7 +421,7 @@
           <a:p>
             <a:fld id="{221DF790-08EF-4309-8C7D-573F11C98FD5}" type="datetimeFigureOut">
               <a:rPr lang="de-AT" smtClean="0"/>
-              <a:t>15.02.2022</a:t>
+              <a:t>18.02.2022</a:t>
             </a:fld>
             <a:endParaRPr lang="de-AT"/>
           </a:p>
@@ -601,7 +601,7 @@
           <a:p>
             <a:fld id="{221DF790-08EF-4309-8C7D-573F11C98FD5}" type="datetimeFigureOut">
               <a:rPr lang="de-AT" smtClean="0"/>
-              <a:t>15.02.2022</a:t>
+              <a:t>18.02.2022</a:t>
             </a:fld>
             <a:endParaRPr lang="de-AT"/>
           </a:p>
@@ -771,7 +771,7 @@
           <a:p>
             <a:fld id="{221DF790-08EF-4309-8C7D-573F11C98FD5}" type="datetimeFigureOut">
               <a:rPr lang="de-AT" smtClean="0"/>
-              <a:t>15.02.2022</a:t>
+              <a:t>18.02.2022</a:t>
             </a:fld>
             <a:endParaRPr lang="de-AT"/>
           </a:p>
@@ -1015,7 +1015,7 @@
           <a:p>
             <a:fld id="{221DF790-08EF-4309-8C7D-573F11C98FD5}" type="datetimeFigureOut">
               <a:rPr lang="de-AT" smtClean="0"/>
-              <a:t>15.02.2022</a:t>
+              <a:t>18.02.2022</a:t>
             </a:fld>
             <a:endParaRPr lang="de-AT"/>
           </a:p>
@@ -1247,7 +1247,7 @@
           <a:p>
             <a:fld id="{221DF790-08EF-4309-8C7D-573F11C98FD5}" type="datetimeFigureOut">
               <a:rPr lang="de-AT" smtClean="0"/>
-              <a:t>15.02.2022</a:t>
+              <a:t>18.02.2022</a:t>
             </a:fld>
             <a:endParaRPr lang="de-AT"/>
           </a:p>
@@ -1614,7 +1614,7 @@
           <a:p>
             <a:fld id="{221DF790-08EF-4309-8C7D-573F11C98FD5}" type="datetimeFigureOut">
               <a:rPr lang="de-AT" smtClean="0"/>
-              <a:t>15.02.2022</a:t>
+              <a:t>18.02.2022</a:t>
             </a:fld>
             <a:endParaRPr lang="de-AT"/>
           </a:p>
@@ -1732,7 +1732,7 @@
           <a:p>
             <a:fld id="{221DF790-08EF-4309-8C7D-573F11C98FD5}" type="datetimeFigureOut">
               <a:rPr lang="de-AT" smtClean="0"/>
-              <a:t>15.02.2022</a:t>
+              <a:t>18.02.2022</a:t>
             </a:fld>
             <a:endParaRPr lang="de-AT"/>
           </a:p>
@@ -1827,7 +1827,7 @@
           <a:p>
             <a:fld id="{221DF790-08EF-4309-8C7D-573F11C98FD5}" type="datetimeFigureOut">
               <a:rPr lang="de-AT" smtClean="0"/>
-              <a:t>15.02.2022</a:t>
+              <a:t>18.02.2022</a:t>
             </a:fld>
             <a:endParaRPr lang="de-AT"/>
           </a:p>
@@ -2104,7 +2104,7 @@
           <a:p>
             <a:fld id="{221DF790-08EF-4309-8C7D-573F11C98FD5}" type="datetimeFigureOut">
               <a:rPr lang="de-AT" smtClean="0"/>
-              <a:t>15.02.2022</a:t>
+              <a:t>18.02.2022</a:t>
             </a:fld>
             <a:endParaRPr lang="de-AT"/>
           </a:p>
@@ -2361,7 +2361,7 @@
           <a:p>
             <a:fld id="{221DF790-08EF-4309-8C7D-573F11C98FD5}" type="datetimeFigureOut">
               <a:rPr lang="de-AT" smtClean="0"/>
-              <a:t>15.02.2022</a:t>
+              <a:t>18.02.2022</a:t>
             </a:fld>
             <a:endParaRPr lang="de-AT"/>
           </a:p>
@@ -2574,7 +2574,7 @@
           <a:p>
             <a:fld id="{221DF790-08EF-4309-8C7D-573F11C98FD5}" type="datetimeFigureOut">
               <a:rPr lang="de-AT" smtClean="0"/>
-              <a:t>15.02.2022</a:t>
+              <a:t>18.02.2022</a:t>
             </a:fld>
             <a:endParaRPr lang="de-AT"/>
           </a:p>
@@ -6370,7 +6370,7 @@
         </p:nvGrpSpPr>
         <p:grpSpPr>
           <a:xfrm>
-            <a:off x="2037263" y="4437323"/>
+            <a:off x="2043613" y="4437323"/>
             <a:ext cx="1815315" cy="871953"/>
             <a:chOff x="3484880" y="609600"/>
             <a:chExt cx="2529840" cy="1620326"/>
@@ -6616,9 +6616,9 @@
           <p:nvPr/>
         </p:nvCxnSpPr>
         <p:spPr>
-          <a:xfrm rot="16200000" flipH="1">
-            <a:off x="2787380" y="5466817"/>
-            <a:ext cx="321051" cy="5968"/>
+          <a:xfrm rot="5400000">
+            <a:off x="2790555" y="5469610"/>
+            <a:ext cx="321051" cy="382"/>
           </a:xfrm>
           <a:prstGeom prst="bentConnector3">
             <a:avLst>
@@ -6651,10 +6651,10 @@
         </p:nvGrpSpPr>
         <p:grpSpPr>
           <a:xfrm>
-            <a:off x="2891865" y="3975450"/>
+            <a:off x="2898215" y="3975450"/>
             <a:ext cx="101250" cy="461872"/>
-            <a:chOff x="5287451" y="-477952"/>
-            <a:chExt cx="162655" cy="876176"/>
+            <a:chOff x="5297652" y="-477952"/>
+            <a:chExt cx="162655" cy="876178"/>
           </a:xfrm>
         </p:grpSpPr>
         <p:sp>
@@ -6671,8 +6671,8 @@
           </p:nvSpPr>
           <p:spPr>
             <a:xfrm flipH="1">
-              <a:off x="5287451" y="-477952"/>
-              <a:ext cx="162655" cy="268901"/>
+              <a:off x="5297652" y="-477952"/>
+              <a:ext cx="162655" cy="268902"/>
             </a:xfrm>
             <a:prstGeom prst="diamond">
               <a:avLst/>
@@ -6720,8 +6720,8 @@
           </p:nvCxnSpPr>
           <p:spPr>
             <a:xfrm rot="16200000" flipH="1">
-              <a:off x="5067093" y="92633"/>
-              <a:ext cx="607277" cy="3905"/>
+              <a:off x="5077293" y="92634"/>
+              <a:ext cx="607278" cy="3905"/>
             </a:xfrm>
             <a:prstGeom prst="bentConnector3">
               <a:avLst>
@@ -6797,7 +6797,7 @@
         </p:nvSpPr>
         <p:spPr>
           <a:xfrm>
-            <a:off x="2920313" y="5378154"/>
+            <a:off x="2923164" y="5374320"/>
             <a:ext cx="604653" cy="213585"/>
           </a:xfrm>
           <a:prstGeom prst="rect">
@@ -7001,12 +7001,12 @@
         </p:nvCxnSpPr>
         <p:spPr>
           <a:xfrm rot="10800000" flipH="1" flipV="1">
-            <a:off x="2037262" y="4998196"/>
-            <a:ext cx="305225" cy="1922291"/>
+            <a:off x="2043612" y="4998196"/>
+            <a:ext cx="298875" cy="1922293"/>
           </a:xfrm>
           <a:prstGeom prst="bentConnector3">
             <a:avLst>
-              <a:gd name="adj1" fmla="val -152912"/>
+              <a:gd name="adj1" fmla="val -199716"/>
             </a:avLst>
           </a:prstGeom>
           <a:noFill/>
@@ -7082,10 +7082,10 @@
         </p:nvGrpSpPr>
         <p:grpSpPr>
           <a:xfrm>
-            <a:off x="4126944" y="4205562"/>
-            <a:ext cx="1511856" cy="1118713"/>
-            <a:chOff x="3484880" y="609600"/>
-            <a:chExt cx="2529840" cy="2078875"/>
+            <a:off x="4126944" y="4142062"/>
+            <a:ext cx="1511856" cy="1188564"/>
+            <a:chOff x="3484880" y="491600"/>
+            <a:chExt cx="2529840" cy="2208677"/>
           </a:xfrm>
         </p:grpSpPr>
         <p:sp>
@@ -7102,8 +7102,8 @@
           </p:nvSpPr>
           <p:spPr>
             <a:xfrm>
-              <a:off x="3484880" y="609600"/>
-              <a:ext cx="2529840" cy="428786"/>
+              <a:off x="3484880" y="491600"/>
+              <a:ext cx="2529840" cy="428785"/>
             </a:xfrm>
             <a:prstGeom prst="rect">
               <a:avLst/>
@@ -7143,21 +7143,7 @@
                   <a:latin typeface="Arial" panose="020B0604020202020204" pitchFamily="34" charset="0"/>
                   <a:cs typeface="Arial" panose="020B0604020202020204" pitchFamily="34" charset="0"/>
                 </a:rPr>
-                <a:t>&lt;&lt;</a:t>
-              </a:r>
-              <a:r>
-                <a:rPr lang="de-AT" sz="1013" b="1" i="1" dirty="0" err="1">
-                  <a:latin typeface="Arial" panose="020B0604020202020204" pitchFamily="34" charset="0"/>
-                  <a:cs typeface="Arial" panose="020B0604020202020204" pitchFamily="34" charset="0"/>
-                </a:rPr>
-                <a:t>abstract</a:t>
-              </a:r>
-              <a:r>
-                <a:rPr lang="de-AT" sz="1013" b="1" i="1" dirty="0">
-                  <a:latin typeface="Arial" panose="020B0604020202020204" pitchFamily="34" charset="0"/>
-                  <a:cs typeface="Arial" panose="020B0604020202020204" pitchFamily="34" charset="0"/>
-                </a:rPr>
-                <a:t>&gt;&gt; Model</a:t>
+                <a:t>Model</a:t>
               </a:r>
             </a:p>
           </p:txBody>
@@ -7176,8 +7162,8 @@
           </p:nvSpPr>
           <p:spPr>
             <a:xfrm>
-              <a:off x="3484880" y="1038386"/>
-              <a:ext cx="2529840" cy="1650089"/>
+              <a:off x="3484880" y="925871"/>
+              <a:ext cx="2529840" cy="1774406"/>
             </a:xfrm>
             <a:prstGeom prst="rect">
               <a:avLst/>
@@ -7312,6 +7298,26 @@
                   <a:cs typeface="Arial" panose="020B0604020202020204" pitchFamily="34" charset="0"/>
                 </a:rPr>
                 <a:t>displayName</a:t>
+              </a:r>
+              <a:endParaRPr lang="de-AT" sz="900" dirty="0">
+                <a:latin typeface="Arial" panose="020B0604020202020204" pitchFamily="34" charset="0"/>
+                <a:cs typeface="Arial" panose="020B0604020202020204" pitchFamily="34" charset="0"/>
+              </a:endParaRPr>
+            </a:p>
+            <a:p>
+              <a:r>
+                <a:rPr lang="de-AT" sz="900" dirty="0">
+                  <a:latin typeface="Arial" panose="020B0604020202020204" pitchFamily="34" charset="0"/>
+                  <a:cs typeface="Arial" panose="020B0604020202020204" pitchFamily="34" charset="0"/>
+                </a:rPr>
+                <a:t>String </a:t>
+              </a:r>
+              <a:r>
+                <a:rPr lang="de-AT" sz="900" dirty="0" err="1">
+                  <a:latin typeface="Arial" panose="020B0604020202020204" pitchFamily="34" charset="0"/>
+                  <a:cs typeface="Arial" panose="020B0604020202020204" pitchFamily="34" charset="0"/>
+                </a:rPr>
+                <a:t>namespace</a:t>
               </a:r>
               <a:endParaRPr lang="de-AT" sz="900" dirty="0">
                 <a:latin typeface="Arial" panose="020B0604020202020204" pitchFamily="34" charset="0"/>
@@ -7707,10 +7713,10 @@
         </p:nvGrpSpPr>
         <p:grpSpPr>
           <a:xfrm rot="10800000">
-            <a:off x="4710200" y="5295024"/>
-            <a:ext cx="101250" cy="476380"/>
-            <a:chOff x="6936843" y="1239542"/>
-            <a:chExt cx="162655" cy="903691"/>
+            <a:off x="4706140" y="5344708"/>
+            <a:ext cx="101250" cy="426696"/>
+            <a:chOff x="6943365" y="1239545"/>
+            <a:chExt cx="162655" cy="809443"/>
           </a:xfrm>
         </p:grpSpPr>
         <p:sp>
@@ -7727,7 +7733,7 @@
           </p:nvSpPr>
           <p:spPr>
             <a:xfrm flipH="1">
-              <a:off x="6936843" y="1874330"/>
+              <a:off x="6943365" y="1780085"/>
               <a:ext cx="162655" cy="268903"/>
             </a:xfrm>
             <a:prstGeom prst="diamond">
@@ -7775,9 +7781,9 @@
             <p:nvPr/>
           </p:nvCxnSpPr>
           <p:spPr>
-            <a:xfrm rot="16200000">
-              <a:off x="6703030" y="1554682"/>
-              <a:ext cx="634788" cy="4508"/>
+            <a:xfrm rot="5400000" flipH="1">
+              <a:off x="6753414" y="1508808"/>
+              <a:ext cx="540541" cy="2015"/>
             </a:xfrm>
             <a:prstGeom prst="bentConnector3">
               <a:avLst>
@@ -7811,7 +7817,7 @@
         </p:nvSpPr>
         <p:spPr>
           <a:xfrm>
-            <a:off x="4692119" y="5468072"/>
+            <a:off x="4677487" y="5486456"/>
             <a:ext cx="753732" cy="213585"/>
           </a:xfrm>
           <a:prstGeom prst="rect">
@@ -9342,10 +9348,10 @@
         </p:nvGrpSpPr>
         <p:grpSpPr>
           <a:xfrm>
-            <a:off x="2913276" y="7365946"/>
-            <a:ext cx="511662" cy="614042"/>
-            <a:chOff x="5652571" y="1703985"/>
-            <a:chExt cx="795231" cy="1682202"/>
+            <a:off x="2900265" y="7259742"/>
+            <a:ext cx="524676" cy="720246"/>
+            <a:chOff x="5632346" y="1413033"/>
+            <a:chExt cx="815457" cy="1973155"/>
           </a:xfrm>
         </p:grpSpPr>
         <p:sp>
@@ -9362,7 +9368,7 @@
           </p:nvSpPr>
           <p:spPr>
             <a:xfrm flipH="1">
-              <a:off x="5652571" y="1703985"/>
+              <a:off x="5632346" y="1413033"/>
               <a:ext cx="157364" cy="388332"/>
             </a:xfrm>
             <a:prstGeom prst="diamond">
@@ -9421,8 +9427,8 @@
           </p:nvCxnSpPr>
           <p:spPr>
             <a:xfrm rot="16200000" flipH="1">
-              <a:off x="5442591" y="2380976"/>
-              <a:ext cx="1293873" cy="716549"/>
+              <a:off x="5287003" y="2225389"/>
+              <a:ext cx="1584825" cy="736774"/>
             </a:xfrm>
             <a:prstGeom prst="bentConnector3">
               <a:avLst>
@@ -9456,10 +9462,10 @@
         </p:nvGrpSpPr>
         <p:grpSpPr>
           <a:xfrm>
-            <a:off x="1933144" y="8700583"/>
-            <a:ext cx="2924946" cy="805727"/>
-            <a:chOff x="5485298" y="-1736543"/>
-            <a:chExt cx="4545951" cy="2262827"/>
+            <a:off x="1928175" y="8748475"/>
+            <a:ext cx="2929914" cy="757834"/>
+            <a:chOff x="5477574" y="-1602042"/>
+            <a:chExt cx="4553672" cy="2128323"/>
           </a:xfrm>
         </p:grpSpPr>
         <p:sp>
@@ -9476,7 +9482,7 @@
           </p:nvSpPr>
           <p:spPr>
             <a:xfrm flipH="1">
-              <a:off x="5485298" y="-1736543"/>
+              <a:off x="5477574" y="-1602042"/>
               <a:ext cx="157363" cy="398095"/>
             </a:xfrm>
             <a:prstGeom prst="diamond">
@@ -9535,12 +9541,12 @@
           </p:nvCxnSpPr>
           <p:spPr>
             <a:xfrm rot="16200000" flipH="1">
-              <a:off x="6865248" y="-2639717"/>
-              <a:ext cx="1864733" cy="4467269"/>
+              <a:off x="6928635" y="-2576330"/>
+              <a:ext cx="1730231" cy="4474991"/>
             </a:xfrm>
             <a:prstGeom prst="bentConnector3">
               <a:avLst>
-                <a:gd name="adj1" fmla="val 134429"/>
+                <a:gd name="adj1" fmla="val 137105"/>
               </a:avLst>
             </a:prstGeom>
             <a:noFill/>

</xml_diff>